<commit_message>
* Upload exercise LogActivityMiddleware
</commit_message>
<xml_diff>
--- a/doc/Demo2- Curso .NET Core.pptx
+++ b/doc/Demo2- Curso .NET Core.pptx
@@ -11,6 +11,7 @@
     <p:sldId id="260" r:id="rId5"/>
     <p:sldId id="261" r:id="rId6"/>
     <p:sldId id="262" r:id="rId7"/>
+    <p:sldId id="263" r:id="rId8"/>
   </p:sldIdLst>
   <p:sldSz cx="12192000" cy="6858000"/>
   <p:notesSz cx="6858000" cy="9144000"/>
@@ -4743,6 +4744,284 @@
 </p:sld>
 </file>
 
+<file path=ppt/slides/slide7.xml><?xml version="1.0" encoding="utf-8"?>
+<p:sld xmlns:a="http://schemas.openxmlformats.org/drawingml/2006/main" xmlns:r="http://schemas.openxmlformats.org/officeDocument/2006/relationships" xmlns:p="http://schemas.openxmlformats.org/presentationml/2006/main">
+  <p:cSld>
+    <p:spTree>
+      <p:nvGrpSpPr>
+        <p:cNvPr id="1" name=""/>
+        <p:cNvGrpSpPr/>
+        <p:nvPr/>
+      </p:nvGrpSpPr>
+      <p:grpSpPr>
+        <a:xfrm>
+          <a:off x="0" y="0"/>
+          <a:ext cx="0" cy="0"/>
+          <a:chOff x="0" y="0"/>
+          <a:chExt cx="0" cy="0"/>
+        </a:xfrm>
+      </p:grpSpPr>
+      <p:sp>
+        <p:nvSpPr>
+          <p:cNvPr id="2" name="Título 1">
+            <a:extLst>
+              <a:ext uri="{FF2B5EF4-FFF2-40B4-BE49-F238E27FC236}">
+                <a16:creationId xmlns:a16="http://schemas.microsoft.com/office/drawing/2014/main" id="{EE31C3AB-6E77-48D5-AA31-0661498892FE}"/>
+              </a:ext>
+            </a:extLst>
+          </p:cNvPr>
+          <p:cNvSpPr>
+            <a:spLocks noGrp="1"/>
+          </p:cNvSpPr>
+          <p:nvPr>
+            <p:ph type="title"/>
+          </p:nvPr>
+        </p:nvSpPr>
+        <p:spPr/>
+        <p:txBody>
+          <a:bodyPr/>
+          <a:lstStyle/>
+          <a:p>
+            <a:r>
+              <a:rPr lang="es-ES" dirty="0"/>
+              <a:t>Ejercicio Middleware personalizado</a:t>
+            </a:r>
+          </a:p>
+        </p:txBody>
+      </p:sp>
+      <p:sp>
+        <p:nvSpPr>
+          <p:cNvPr id="3" name="Marcador de contenido 2">
+            <a:extLst>
+              <a:ext uri="{FF2B5EF4-FFF2-40B4-BE49-F238E27FC236}">
+                <a16:creationId xmlns:a16="http://schemas.microsoft.com/office/drawing/2014/main" id="{AD4708DA-1B45-46D3-91BE-1238AE4C6E27}"/>
+              </a:ext>
+            </a:extLst>
+          </p:cNvPr>
+          <p:cNvSpPr>
+            <a:spLocks noGrp="1"/>
+          </p:cNvSpPr>
+          <p:nvPr>
+            <p:ph idx="1"/>
+          </p:nvPr>
+        </p:nvSpPr>
+        <p:spPr>
+          <a:xfrm>
+            <a:off x="1371600" y="1937857"/>
+            <a:ext cx="9601200" cy="4429387"/>
+          </a:xfrm>
+        </p:spPr>
+        <p:txBody>
+          <a:bodyPr>
+            <a:normAutofit/>
+          </a:bodyPr>
+          <a:lstStyle/>
+          <a:p>
+            <a:r>
+              <a:rPr lang="es-ES" dirty="0"/>
+              <a:t>Descargar o clonar el proyecto Demo2 de la siguiente url: </a:t>
+            </a:r>
+            <a:r>
+              <a:rPr lang="es-ES" dirty="0">
+                <a:hlinkClick r:id="rId2"/>
+              </a:rPr>
+              <a:t>https://github.com/dadjh85/Demo2-Curso-.NetCore3.1</a:t>
+            </a:r>
+            <a:endParaRPr lang="es-ES" dirty="0"/>
+          </a:p>
+          <a:p>
+            <a:r>
+              <a:rPr lang="es-ES" dirty="0"/>
+              <a:t>Acceder a la clase </a:t>
+            </a:r>
+            <a:r>
+              <a:rPr lang="es-ES" dirty="0" err="1"/>
+              <a:t>LogActivityMiddleware</a:t>
+            </a:r>
+            <a:r>
+              <a:rPr lang="es-ES" dirty="0"/>
+              <a:t>, completar el middleware para que capture la ruta de un </a:t>
+            </a:r>
+            <a:r>
+              <a:rPr lang="es-ES" dirty="0" err="1"/>
+              <a:t>endpoint</a:t>
+            </a:r>
+            <a:r>
+              <a:rPr lang="es-ES" dirty="0"/>
+              <a:t> y la respuesta del status </a:t>
+            </a:r>
+            <a:r>
+              <a:rPr lang="es-ES" dirty="0" err="1"/>
+              <a:t>code</a:t>
+            </a:r>
+            <a:r>
+              <a:rPr lang="es-ES" dirty="0"/>
+              <a:t> http de respuesta a esa petición y lo imprima en la consola de visual </a:t>
+            </a:r>
+            <a:r>
+              <a:rPr lang="es-ES" dirty="0" err="1"/>
+              <a:t>studio</a:t>
+            </a:r>
+            <a:r>
+              <a:rPr lang="es-ES" dirty="0"/>
+              <a:t>:</a:t>
+            </a:r>
+          </a:p>
+          <a:p>
+            <a:pPr lvl="1"/>
+            <a:r>
+              <a:rPr lang="es-ES" dirty="0"/>
+              <a:t>Notas:</a:t>
+            </a:r>
+          </a:p>
+          <a:p>
+            <a:pPr lvl="2"/>
+            <a:r>
+              <a:rPr lang="es-ES" dirty="0"/>
+              <a:t>Para capturar la ruta es necesario escribir el código después del _</a:t>
+            </a:r>
+            <a:r>
+              <a:rPr lang="es-ES" dirty="0" err="1"/>
+              <a:t>next</a:t>
+            </a:r>
+            <a:endParaRPr lang="es-ES" dirty="0"/>
+          </a:p>
+          <a:p>
+            <a:pPr lvl="2"/>
+            <a:r>
+              <a:rPr lang="es-ES" dirty="0"/>
+              <a:t>Para obtener la ruta de un </a:t>
+            </a:r>
+            <a:r>
+              <a:rPr lang="es-ES" dirty="0" err="1"/>
+              <a:t>endpoint</a:t>
+            </a:r>
+            <a:r>
+              <a:rPr lang="es-ES" dirty="0"/>
+              <a:t> solicitado se puede utilizar la siguiente línea de código: </a:t>
+            </a:r>
+            <a:r>
+              <a:rPr lang="es-ES" b="1" dirty="0" err="1"/>
+              <a:t>var</a:t>
+            </a:r>
+            <a:r>
+              <a:rPr lang="es-ES" b="1" dirty="0"/>
+              <a:t> </a:t>
+            </a:r>
+            <a:r>
+              <a:rPr lang="es-ES" b="1" dirty="0" err="1"/>
+              <a:t>path</a:t>
+            </a:r>
+            <a:r>
+              <a:rPr lang="es-ES" b="1" dirty="0"/>
+              <a:t> = </a:t>
+            </a:r>
+            <a:r>
+              <a:rPr lang="es-ES" b="1" dirty="0" err="1"/>
+              <a:t>context.Request.Path</a:t>
+            </a:r>
+            <a:r>
+              <a:rPr lang="es-ES" b="1" dirty="0"/>
+              <a:t>;</a:t>
+            </a:r>
+          </a:p>
+          <a:p>
+            <a:pPr lvl="2"/>
+            <a:r>
+              <a:rPr lang="es-ES" dirty="0"/>
+              <a:t>Para obtener el </a:t>
+            </a:r>
+            <a:r>
+              <a:rPr lang="es-ES" dirty="0" err="1"/>
+              <a:t>Codigo</a:t>
+            </a:r>
+            <a:r>
+              <a:rPr lang="es-ES" dirty="0"/>
+              <a:t> de respuesta de la petición se puede utilizar la siguiente instrucción: </a:t>
+            </a:r>
+            <a:r>
+              <a:rPr lang="es-ES" b="1" dirty="0" err="1"/>
+              <a:t>var</a:t>
+            </a:r>
+            <a:r>
+              <a:rPr lang="es-ES" b="1" dirty="0"/>
+              <a:t> </a:t>
+            </a:r>
+            <a:r>
+              <a:rPr lang="es-ES" b="1" dirty="0" err="1"/>
+              <a:t>responseCode</a:t>
+            </a:r>
+            <a:r>
+              <a:rPr lang="es-ES" b="1" dirty="0"/>
+              <a:t> = </a:t>
+            </a:r>
+            <a:r>
+              <a:rPr lang="es-ES" b="1" dirty="0" err="1"/>
+              <a:t>context.Response.StatusCode</a:t>
+            </a:r>
+            <a:r>
+              <a:rPr lang="es-ES" b="1" dirty="0"/>
+              <a:t>;</a:t>
+            </a:r>
+          </a:p>
+          <a:p>
+            <a:pPr lvl="2"/>
+            <a:r>
+              <a:rPr lang="es-ES" dirty="0"/>
+              <a:t>Para imprimir el </a:t>
+            </a:r>
+            <a:r>
+              <a:rPr lang="es-ES" dirty="0" err="1"/>
+              <a:t>path</a:t>
+            </a:r>
+            <a:r>
+              <a:rPr lang="es-ES" dirty="0"/>
+              <a:t> y código de respuesta se puede utilizar la siguiente instrucción: </a:t>
+            </a:r>
+            <a:r>
+              <a:rPr lang="es-ES" b="1" dirty="0"/>
+              <a:t>_</a:t>
+            </a:r>
+            <a:r>
+              <a:rPr lang="es-ES" b="1" dirty="0" err="1"/>
+              <a:t>logger.LogDebug</a:t>
+            </a:r>
+            <a:r>
+              <a:rPr lang="es-ES" b="1" dirty="0"/>
+              <a:t>($”{</a:t>
+            </a:r>
+            <a:r>
+              <a:rPr lang="es-ES" b="1" dirty="0" err="1"/>
+              <a:t>path</a:t>
+            </a:r>
+            <a:r>
+              <a:rPr lang="es-ES" b="1" dirty="0"/>
+              <a:t>} – {</a:t>
+            </a:r>
+            <a:r>
+              <a:rPr lang="es-ES" b="1" dirty="0" err="1"/>
+              <a:t>responseCode</a:t>
+            </a:r>
+            <a:r>
+              <a:rPr lang="es-ES" b="1" dirty="0"/>
+              <a:t>}“); </a:t>
+            </a:r>
+          </a:p>
+        </p:txBody>
+      </p:sp>
+    </p:spTree>
+    <p:extLst>
+      <p:ext uri="{BB962C8B-B14F-4D97-AF65-F5344CB8AC3E}">
+        <p14:creationId xmlns:p14="http://schemas.microsoft.com/office/powerpoint/2010/main" val="820437913"/>
+      </p:ext>
+    </p:extLst>
+  </p:cSld>
+  <p:clrMapOvr>
+    <a:masterClrMapping/>
+  </p:clrMapOvr>
+</p:sld>
+</file>
+
 <file path=ppt/theme/theme1.xml><?xml version="1.0" encoding="utf-8"?>
 <a:theme xmlns:a="http://schemas.openxmlformats.org/drawingml/2006/main" name="Recorte">
   <a:themeElements>

</xml_diff>